<commit_message>
add "questionn x feedback" slide.
</commit_message>
<xml_diff>
--- a/template/ppt-template.pptx
+++ b/template/ppt-template.pptx
@@ -3295,6 +3295,256 @@
           <a:chExt cx="0" cy="0"/>
         </a:xfrm>
       </p:grpSpPr>
+      <p:pic>
+        <p:nvPicPr>
+          <p:cNvPr id="3" name="Picture 2"/>
+          <p:cNvPicPr>
+            <a:picLocks noChangeAspect="1"/>
+          </p:cNvPicPr>
+          <p:nvPr/>
+        </p:nvPicPr>
+        <p:blipFill>
+          <a:blip r:embed="rId2"/>
+          <a:stretch>
+            <a:fillRect/>
+          </a:stretch>
+        </p:blipFill>
+        <p:spPr>
+          <a:xfrm rot="19797397">
+            <a:off x="521148" y="983439"/>
+            <a:ext cx="3325039" cy="2203669"/>
+          </a:xfrm>
+          <a:prstGeom prst="rect">
+            <a:avLst/>
+          </a:prstGeom>
+        </p:spPr>
+      </p:pic>
+      <p:pic>
+        <p:nvPicPr>
+          <p:cNvPr id="7" name="Picture 6"/>
+          <p:cNvPicPr>
+            <a:picLocks noChangeAspect="1"/>
+          </p:cNvPicPr>
+          <p:nvPr/>
+        </p:nvPicPr>
+        <p:blipFill>
+          <a:blip r:embed="rId3"/>
+          <a:stretch>
+            <a:fillRect/>
+          </a:stretch>
+        </p:blipFill>
+        <p:spPr>
+          <a:xfrm>
+            <a:off x="8042575" y="518880"/>
+            <a:ext cx="3958171" cy="2787027"/>
+          </a:xfrm>
+          <a:prstGeom prst="rect">
+            <a:avLst/>
+          </a:prstGeom>
+        </p:spPr>
+      </p:pic>
+      <p:pic>
+        <p:nvPicPr>
+          <p:cNvPr id="5" name="Picture 4"/>
+          <p:cNvPicPr>
+            <a:picLocks noChangeAspect="1"/>
+          </p:cNvPicPr>
+          <p:nvPr/>
+        </p:nvPicPr>
+        <p:blipFill>
+          <a:blip r:embed="rId4"/>
+          <a:stretch>
+            <a:fillRect/>
+          </a:stretch>
+        </p:blipFill>
+        <p:spPr>
+          <a:xfrm>
+            <a:off x="332508" y="4153028"/>
+            <a:ext cx="3702317" cy="2253584"/>
+          </a:xfrm>
+          <a:prstGeom prst="rect">
+            <a:avLst/>
+          </a:prstGeom>
+        </p:spPr>
+      </p:pic>
+      <p:pic>
+        <p:nvPicPr>
+          <p:cNvPr id="10" name="Picture 9"/>
+          <p:cNvPicPr>
+            <a:picLocks noChangeAspect="1"/>
+          </p:cNvPicPr>
+          <p:nvPr/>
+        </p:nvPicPr>
+        <p:blipFill>
+          <a:blip r:embed="rId5"/>
+          <a:stretch>
+            <a:fillRect/>
+          </a:stretch>
+        </p:blipFill>
+        <p:spPr>
+          <a:xfrm>
+            <a:off x="5016967" y="443801"/>
+            <a:ext cx="2420438" cy="3728783"/>
+          </a:xfrm>
+          <a:prstGeom prst="rect">
+            <a:avLst/>
+          </a:prstGeom>
+        </p:spPr>
+      </p:pic>
+      <p:pic>
+        <p:nvPicPr>
+          <p:cNvPr id="12" name="Picture 11"/>
+          <p:cNvPicPr>
+            <a:picLocks noChangeAspect="1"/>
+          </p:cNvPicPr>
+          <p:nvPr/>
+        </p:nvPicPr>
+        <p:blipFill>
+          <a:blip r:embed="rId6"/>
+          <a:stretch>
+            <a:fillRect/>
+          </a:stretch>
+        </p:blipFill>
+        <p:spPr>
+          <a:xfrm rot="1865775">
+            <a:off x="9316647" y="3937907"/>
+            <a:ext cx="2381250" cy="2209800"/>
+          </a:xfrm>
+          <a:prstGeom prst="rect">
+            <a:avLst/>
+          </a:prstGeom>
+        </p:spPr>
+      </p:pic>
+      <p:pic>
+        <p:nvPicPr>
+          <p:cNvPr id="14" name="Picture 13"/>
+          <p:cNvPicPr>
+            <a:picLocks noChangeAspect="1"/>
+          </p:cNvPicPr>
+          <p:nvPr/>
+        </p:nvPicPr>
+        <p:blipFill>
+          <a:blip r:embed="rId7"/>
+          <a:stretch>
+            <a:fillRect/>
+          </a:stretch>
+        </p:blipFill>
+        <p:spPr>
+          <a:xfrm>
+            <a:off x="5655975" y="4281632"/>
+            <a:ext cx="874134" cy="874134"/>
+          </a:xfrm>
+          <a:prstGeom prst="rect">
+            <a:avLst/>
+          </a:prstGeom>
+        </p:spPr>
+      </p:pic>
+      <p:pic>
+        <p:nvPicPr>
+          <p:cNvPr id="16" name="Picture 15"/>
+          <p:cNvPicPr>
+            <a:picLocks noChangeAspect="1"/>
+          </p:cNvPicPr>
+          <p:nvPr/>
+        </p:nvPicPr>
+        <p:blipFill>
+          <a:blip r:embed="rId8"/>
+          <a:stretch>
+            <a:fillRect/>
+          </a:stretch>
+        </p:blipFill>
+        <p:spPr>
+          <a:xfrm flipH="1">
+            <a:off x="4437671" y="5366635"/>
+            <a:ext cx="431540" cy="287581"/>
+          </a:xfrm>
+          <a:prstGeom prst="rect">
+            <a:avLst/>
+          </a:prstGeom>
+        </p:spPr>
+      </p:pic>
+      <p:sp>
+        <p:nvSpPr>
+          <p:cNvPr id="17" name="TextBox 16"/>
+          <p:cNvSpPr txBox="1"/>
+          <p:nvPr/>
+        </p:nvSpPr>
+        <p:spPr>
+          <a:xfrm>
+            <a:off x="4845399" y="5284884"/>
+            <a:ext cx="2668295" cy="369332"/>
+          </a:xfrm>
+          <a:prstGeom prst="rect">
+            <a:avLst/>
+          </a:prstGeom>
+          <a:noFill/>
+        </p:spPr>
+        <p:txBody>
+          <a:bodyPr wrap="none" rtlCol="0">
+            <a:spAutoFit/>
+          </a:bodyPr>
+          <a:lstStyle/>
+          <a:p>
+            <a:r>
+              <a:rPr lang="pt-BR" b="1" i="1" dirty="0"/>
+              <a:t>jcbrasileiro@hotmail.com</a:t>
+            </a:r>
+          </a:p>
+        </p:txBody>
+      </p:sp>
+      <p:pic>
+        <p:nvPicPr>
+          <p:cNvPr id="19" name="Picture 18"/>
+          <p:cNvPicPr>
+            <a:picLocks noChangeAspect="1"/>
+          </p:cNvPicPr>
+          <p:nvPr/>
+        </p:nvPicPr>
+        <p:blipFill>
+          <a:blip r:embed="rId9"/>
+          <a:stretch>
+            <a:fillRect/>
+          </a:stretch>
+        </p:blipFill>
+        <p:spPr>
+          <a:xfrm>
+            <a:off x="4529701" y="5849174"/>
+            <a:ext cx="243896" cy="243896"/>
+          </a:xfrm>
+          <a:prstGeom prst="rect">
+            <a:avLst/>
+          </a:prstGeom>
+        </p:spPr>
+      </p:pic>
+      <p:sp>
+        <p:nvSpPr>
+          <p:cNvPr id="22" name="TextBox 21"/>
+          <p:cNvSpPr txBox="1"/>
+          <p:nvPr/>
+        </p:nvSpPr>
+        <p:spPr>
+          <a:xfrm>
+            <a:off x="4841176" y="5765054"/>
+            <a:ext cx="2816284" cy="369332"/>
+          </a:xfrm>
+          <a:prstGeom prst="rect">
+            <a:avLst/>
+          </a:prstGeom>
+          <a:noFill/>
+        </p:spPr>
+        <p:txBody>
+          <a:bodyPr wrap="none" rtlCol="0">
+            <a:spAutoFit/>
+          </a:bodyPr>
+          <a:lstStyle/>
+          <a:p>
+            <a:r>
+              <a:rPr lang="pt-BR" b="1" i="1" dirty="0"/>
+              <a:t>joaocbrasileiro@gmail.com</a:t>
+            </a:r>
+          </a:p>
+        </p:txBody>
+      </p:sp>
     </p:spTree>
     <p:extLst>
       <p:ext uri="{BB962C8B-B14F-4D97-AF65-F5344CB8AC3E}">

</xml_diff>